<commit_message>
updated chart.js and changed visualization image in presentation
</commit_message>
<xml_diff>
--- a/Project 2_PowerPoint_11.1.2021.pptx
+++ b/Project 2_PowerPoint_11.1.2021.pptx
@@ -1894,20 +1894,20 @@
     <dgm:cxn modelId="{563D9334-81FC-7E40-9ABB-80316D658473}" type="presOf" srcId="{97F37D15-251D-1A4C-A9F0-8BE56B113EED}" destId="{C85929B3-C008-9048-9995-1DE84295D60C}" srcOrd="0" destOrd="1" presId="urn:microsoft.com/office/officeart/2005/8/layout/hList1"/>
     <dgm:cxn modelId="{FD72B137-4827-7146-A70B-40E1858B6775}" srcId="{2EBACADF-7EDF-40A3-9504-9E45B80D2CA7}" destId="{50256CAE-BE3F-E64E-AD2F-B50543B098CC}" srcOrd="1" destOrd="0" parTransId="{F64EA75E-CA3A-C044-AC96-509C1739EF2E}" sibTransId="{C89366B3-2110-0744-9930-CB77220D75B4}"/>
     <dgm:cxn modelId="{82739C39-CD87-42DA-B77F-44792D0E088D}" srcId="{CD04AF2E-C455-4C10-80A4-BC9F6B58DA13}" destId="{922E310B-91C4-4F50-B0DE-7561D24719EF}" srcOrd="0" destOrd="0" parTransId="{BA963160-3D98-4578-939A-180B9C2CFDC6}" sibTransId="{3D4B3234-7D7B-44D1-8DBF-45A2E06829A5}"/>
+    <dgm:cxn modelId="{FD6D5B5B-4717-A744-9818-5E24D14A57BE}" type="presOf" srcId="{235E50E7-10A0-734C-807B-EEB9E029ED9F}" destId="{6262A8A3-6365-8A4B-84A0-DED941899EEC}" srcOrd="0" destOrd="5" presId="urn:microsoft.com/office/officeart/2005/8/layout/hList1"/>
     <dgm:cxn modelId="{ABAC4642-6FC2-F14F-90F8-9F99FB892215}" type="presOf" srcId="{0A992B3D-F942-B346-9C29-0433D2DEDC86}" destId="{D54EB2DE-E2FC-E545-909C-D6ADBB4F4EBE}" srcOrd="0" destOrd="4" presId="urn:microsoft.com/office/officeart/2005/8/layout/hList1"/>
     <dgm:cxn modelId="{8B7FD043-EDAC-C24A-844E-14FB53F2FAD9}" srcId="{50256CAE-BE3F-E64E-AD2F-B50543B098CC}" destId="{96CC0E9F-0DF4-A44D-A6C9-722E664E66FD}" srcOrd="0" destOrd="0" parTransId="{2C8BFA7B-C215-2C48-9547-629C484CDFDD}" sibTransId="{1DA40AB6-BC99-7347-8D46-1F036BE8816A}"/>
+    <dgm:cxn modelId="{18B0D863-3F32-4D3A-AC71-7D26B0CB9D5D}" srcId="{2EBACADF-7EDF-40A3-9504-9E45B80D2CA7}" destId="{CD04AF2E-C455-4C10-80A4-BC9F6B58DA13}" srcOrd="0" destOrd="0" parTransId="{F17F8640-B724-4838-88E9-9F4495C326C1}" sibTransId="{D373BC51-4DE9-4C71-80B2-5C01C9993F5C}"/>
     <dgm:cxn modelId="{9F45A545-CC36-4361-B2EA-AFD0CCBA13B1}" srcId="{6735EF61-FD61-4E35-960E-2E864A1AF7A6}" destId="{EA90380A-AE43-48AE-BD79-A648EF371D1E}" srcOrd="1" destOrd="0" parTransId="{0E85DADD-B719-4AB8-9087-EF36265AAE76}" sibTransId="{EE501E54-4A0B-4F4A-8040-DBC4631ECBD0}"/>
+    <dgm:cxn modelId="{821B8769-F311-420E-91DD-30979C54F699}" srcId="{6735EF61-FD61-4E35-960E-2E864A1AF7A6}" destId="{308C6E81-DB07-4CE7-9902-391AAF02E443}" srcOrd="0" destOrd="0" parTransId="{416970B5-B657-4AB3-B9C0-A26243127DFB}" sibTransId="{E11A05D8-09A1-4D33-BE6A-F891E8D06541}"/>
+    <dgm:cxn modelId="{47F80D6C-3A70-984B-A55E-9DEADB0431DC}" type="presOf" srcId="{E9645EDC-1DBE-CD48-8D09-27CB14C92739}" destId="{6262A8A3-6365-8A4B-84A0-DED941899EEC}" srcOrd="0" destOrd="4" presId="urn:microsoft.com/office/officeart/2005/8/layout/hList1"/>
     <dgm:cxn modelId="{AC56264C-172A-BC45-A556-A316123C7F62}" type="presOf" srcId="{308C6E81-DB07-4CE7-9902-391AAF02E443}" destId="{DCA52BDD-AE07-134E-B1EB-A29178B8F4F2}" srcOrd="0" destOrd="0" presId="urn:microsoft.com/office/officeart/2005/8/layout/hList1"/>
     <dgm:cxn modelId="{2B7F0D4D-1F7A-FB43-AB7C-57C6067EE3EB}" srcId="{399E5069-6F4A-2546-B5EC-76FB87898A1E}" destId="{16438355-D7B1-F242-A4F7-B2A2797553E6}" srcOrd="0" destOrd="0" parTransId="{2966D924-144D-8D47-89B7-7A944E795F99}" sibTransId="{3DEB1EBA-402C-1745-A634-3AA18A5DEC2E}"/>
     <dgm:cxn modelId="{AD7BE84D-C2F2-DD4F-898B-86277FDE4315}" srcId="{5D4E3942-26DC-417E-B806-58A3F2569BFB}" destId="{97F37D15-251D-1A4C-A9F0-8BE56B113EED}" srcOrd="1" destOrd="0" parTransId="{AE26A859-9D2A-884F-B74A-7158CAE1D7C5}" sibTransId="{16BCDE5C-1AA6-D24D-A062-A1FB7399B12C}"/>
+    <dgm:cxn modelId="{20ACAE6E-045E-AE49-81A0-2DDDB1AC1907}" srcId="{308C6E81-DB07-4CE7-9902-391AAF02E443}" destId="{CA804055-8086-8B44-94FC-6C4553A1053A}" srcOrd="0" destOrd="0" parTransId="{EDF51E07-44BB-4648-8A9E-1F8489600000}" sibTransId="{30CA9901-5F40-F843-A88A-B9AB95B36DDD}"/>
     <dgm:cxn modelId="{9EF9454F-5958-4B48-A018-237964028504}" type="presOf" srcId="{5D4E3942-26DC-417E-B806-58A3F2569BFB}" destId="{78F08974-5771-074A-854C-12DA8420B37A}" srcOrd="0" destOrd="0" presId="urn:microsoft.com/office/officeart/2005/8/layout/hList1"/>
     <dgm:cxn modelId="{90F08E4F-E711-6642-97E3-2357E73A1DA2}" type="presOf" srcId="{F2560EFC-2011-824A-8004-DDA6025AE48E}" destId="{D54EB2DE-E2FC-E545-909C-D6ADBB4F4EBE}" srcOrd="0" destOrd="1" presId="urn:microsoft.com/office/officeart/2005/8/layout/hList1"/>
     <dgm:cxn modelId="{90C54D53-4EB9-9E4E-A9AB-C74454FCDBB4}" type="presOf" srcId="{EA90380A-AE43-48AE-BD79-A648EF371D1E}" destId="{DCA52BDD-AE07-134E-B1EB-A29178B8F4F2}" srcOrd="0" destOrd="3" presId="urn:microsoft.com/office/officeart/2005/8/layout/hList1"/>
-    <dgm:cxn modelId="{FD6D5B5B-4717-A744-9818-5E24D14A57BE}" type="presOf" srcId="{235E50E7-10A0-734C-807B-EEB9E029ED9F}" destId="{6262A8A3-6365-8A4B-84A0-DED941899EEC}" srcOrd="0" destOrd="5" presId="urn:microsoft.com/office/officeart/2005/8/layout/hList1"/>
-    <dgm:cxn modelId="{18B0D863-3F32-4D3A-AC71-7D26B0CB9D5D}" srcId="{2EBACADF-7EDF-40A3-9504-9E45B80D2CA7}" destId="{CD04AF2E-C455-4C10-80A4-BC9F6B58DA13}" srcOrd="0" destOrd="0" parTransId="{F17F8640-B724-4838-88E9-9F4495C326C1}" sibTransId="{D373BC51-4DE9-4C71-80B2-5C01C9993F5C}"/>
-    <dgm:cxn modelId="{821B8769-F311-420E-91DD-30979C54F699}" srcId="{6735EF61-FD61-4E35-960E-2E864A1AF7A6}" destId="{308C6E81-DB07-4CE7-9902-391AAF02E443}" srcOrd="0" destOrd="0" parTransId="{416970B5-B657-4AB3-B9C0-A26243127DFB}" sibTransId="{E11A05D8-09A1-4D33-BE6A-F891E8D06541}"/>
-    <dgm:cxn modelId="{47F80D6C-3A70-984B-A55E-9DEADB0431DC}" type="presOf" srcId="{E9645EDC-1DBE-CD48-8D09-27CB14C92739}" destId="{6262A8A3-6365-8A4B-84A0-DED941899EEC}" srcOrd="0" destOrd="4" presId="urn:microsoft.com/office/officeart/2005/8/layout/hList1"/>
-    <dgm:cxn modelId="{20ACAE6E-045E-AE49-81A0-2DDDB1AC1907}" srcId="{308C6E81-DB07-4CE7-9902-391AAF02E443}" destId="{CA804055-8086-8B44-94FC-6C4553A1053A}" srcOrd="0" destOrd="0" parTransId="{EDF51E07-44BB-4648-8A9E-1F8489600000}" sibTransId="{30CA9901-5F40-F843-A88A-B9AB95B36DDD}"/>
     <dgm:cxn modelId="{D7B3757B-32FD-3046-BC9D-A820BF7FCA7D}" srcId="{CD04AF2E-C455-4C10-80A4-BC9F6B58DA13}" destId="{F2560EFC-2011-824A-8004-DDA6025AE48E}" srcOrd="1" destOrd="0" parTransId="{87E49512-144F-E14C-8E63-1D98F4613B6D}" sibTransId="{063DD8BC-7FC8-D349-BFA9-167E9F38DE01}"/>
     <dgm:cxn modelId="{99171C7F-1C61-8940-BF99-5681E23C3C3D}" type="presOf" srcId="{2EBACADF-7EDF-40A3-9504-9E45B80D2CA7}" destId="{94D5177B-8506-3948-B607-A34EE454EC13}" srcOrd="0" destOrd="0" presId="urn:microsoft.com/office/officeart/2005/8/layout/hList1"/>
     <dgm:cxn modelId="{2D302C7F-D63F-6145-B683-9CE6129856A2}" srcId="{50256CAE-BE3F-E64E-AD2F-B50543B098CC}" destId="{235E50E7-10A0-734C-807B-EEB9E029ED9F}" srcOrd="2" destOrd="0" parTransId="{3D0D7AC9-7947-B048-9F10-78747890B3C0}" sibTransId="{C39553EE-7C74-A74F-8BCC-D519A93EF925}"/>
@@ -4229,7 +4229,7 @@
           <a:p>
             <a:fld id="{8FB9C271-0EE6-D44B-803B-B5AF1A748633}" type="datetimeFigureOut">
               <a:rPr lang="en-US" smtClean="0"/>
-              <a:t>10/30/21</a:t>
+              <a:t>11/1/2021</a:t>
             </a:fld>
             <a:endParaRPr lang="en-US"/>
           </a:p>
@@ -4540,6 +4540,90 @@
           <a:bodyPr/>
           <a:lstStyle/>
           <a:p>
+            <a:endParaRPr lang="en-US" dirty="0"/>
+          </a:p>
+        </p:txBody>
+      </p:sp>
+      <p:sp>
+        <p:nvSpPr>
+          <p:cNvPr id="4" name="Slide Number Placeholder 3"/>
+          <p:cNvSpPr>
+            <a:spLocks noGrp="1"/>
+          </p:cNvSpPr>
+          <p:nvPr>
+            <p:ph type="sldNum" sz="quarter" idx="5"/>
+          </p:nvPr>
+        </p:nvSpPr>
+        <p:spPr/>
+        <p:txBody>
+          <a:bodyPr/>
+          <a:lstStyle/>
+          <a:p>
+            <a:fld id="{728E58FA-46D5-0041-B59D-6EB6283186CC}" type="slidenum">
+              <a:rPr lang="en-US" smtClean="0"/>
+              <a:t>5</a:t>
+            </a:fld>
+            <a:endParaRPr lang="en-US"/>
+          </a:p>
+        </p:txBody>
+      </p:sp>
+    </p:spTree>
+    <p:extLst>
+      <p:ext uri="{BB962C8B-B14F-4D97-AF65-F5344CB8AC3E}">
+        <p14:creationId xmlns:p14="http://schemas.microsoft.com/office/powerpoint/2010/main" val="3399326545"/>
+      </p:ext>
+    </p:extLst>
+  </p:cSld>
+  <p:clrMapOvr>
+    <a:masterClrMapping/>
+  </p:clrMapOvr>
+</p:notes>
+</file>
+
+<file path=ppt/notesSlides/notesSlide2.xml><?xml version="1.0" encoding="utf-8"?>
+<p:notes xmlns:a="http://schemas.openxmlformats.org/drawingml/2006/main" xmlns:r="http://schemas.openxmlformats.org/officeDocument/2006/relationships" xmlns:p="http://schemas.openxmlformats.org/presentationml/2006/main">
+  <p:cSld>
+    <p:spTree>
+      <p:nvGrpSpPr>
+        <p:cNvPr id="1" name=""/>
+        <p:cNvGrpSpPr/>
+        <p:nvPr/>
+      </p:nvGrpSpPr>
+      <p:grpSpPr>
+        <a:xfrm>
+          <a:off x="0" y="0"/>
+          <a:ext cx="0" cy="0"/>
+          <a:chOff x="0" y="0"/>
+          <a:chExt cx="0" cy="0"/>
+        </a:xfrm>
+      </p:grpSpPr>
+      <p:sp>
+        <p:nvSpPr>
+          <p:cNvPr id="2" name="Slide Image Placeholder 1"/>
+          <p:cNvSpPr>
+            <a:spLocks noGrp="1" noRot="1" noChangeAspect="1"/>
+          </p:cNvSpPr>
+          <p:nvPr>
+            <p:ph type="sldImg"/>
+          </p:nvPr>
+        </p:nvSpPr>
+        <p:spPr/>
+      </p:sp>
+      <p:sp>
+        <p:nvSpPr>
+          <p:cNvPr id="3" name="Notes Placeholder 2"/>
+          <p:cNvSpPr>
+            <a:spLocks noGrp="1"/>
+          </p:cNvSpPr>
+          <p:nvPr>
+            <p:ph type="body" idx="1"/>
+          </p:nvPr>
+        </p:nvSpPr>
+        <p:spPr/>
+        <p:txBody>
+          <a:bodyPr/>
+          <a:lstStyle/>
+          <a:p>
             <a:r>
               <a:rPr lang="en-US" dirty="0"/>
               <a:t>(demo now)</a:t>
@@ -4730,7 +4814,7 @@
           <a:p>
             <a:fld id="{43D302DD-A437-A144-B97F-1A7125096EB2}" type="datetimeFigureOut">
               <a:rPr lang="en-US" smtClean="0"/>
-              <a:t>10/30/21</a:t>
+              <a:t>11/1/2021</a:t>
             </a:fld>
             <a:endParaRPr lang="en-US"/>
           </a:p>
@@ -4928,7 +5012,7 @@
           <a:p>
             <a:fld id="{43D302DD-A437-A144-B97F-1A7125096EB2}" type="datetimeFigureOut">
               <a:rPr lang="en-US" smtClean="0"/>
-              <a:t>10/30/21</a:t>
+              <a:t>11/1/2021</a:t>
             </a:fld>
             <a:endParaRPr lang="en-US"/>
           </a:p>
@@ -5136,7 +5220,7 @@
           <a:p>
             <a:fld id="{43D302DD-A437-A144-B97F-1A7125096EB2}" type="datetimeFigureOut">
               <a:rPr lang="en-US" smtClean="0"/>
-              <a:t>10/30/21</a:t>
+              <a:t>11/1/2021</a:t>
             </a:fld>
             <a:endParaRPr lang="en-US"/>
           </a:p>
@@ -5334,7 +5418,7 @@
           <a:p>
             <a:fld id="{43D302DD-A437-A144-B97F-1A7125096EB2}" type="datetimeFigureOut">
               <a:rPr lang="en-US" smtClean="0"/>
-              <a:t>10/30/21</a:t>
+              <a:t>11/1/2021</a:t>
             </a:fld>
             <a:endParaRPr lang="en-US"/>
           </a:p>
@@ -5609,7 +5693,7 @@
           <a:p>
             <a:fld id="{43D302DD-A437-A144-B97F-1A7125096EB2}" type="datetimeFigureOut">
               <a:rPr lang="en-US" smtClean="0"/>
-              <a:t>10/30/21</a:t>
+              <a:t>11/1/2021</a:t>
             </a:fld>
             <a:endParaRPr lang="en-US"/>
           </a:p>
@@ -5874,7 +5958,7 @@
           <a:p>
             <a:fld id="{43D302DD-A437-A144-B97F-1A7125096EB2}" type="datetimeFigureOut">
               <a:rPr lang="en-US" smtClean="0"/>
-              <a:t>10/30/21</a:t>
+              <a:t>11/1/2021</a:t>
             </a:fld>
             <a:endParaRPr lang="en-US"/>
           </a:p>
@@ -6286,7 +6370,7 @@
           <a:p>
             <a:fld id="{43D302DD-A437-A144-B97F-1A7125096EB2}" type="datetimeFigureOut">
               <a:rPr lang="en-US" smtClean="0"/>
-              <a:t>10/30/21</a:t>
+              <a:t>11/1/2021</a:t>
             </a:fld>
             <a:endParaRPr lang="en-US"/>
           </a:p>
@@ -6427,7 +6511,7 @@
           <a:p>
             <a:fld id="{43D302DD-A437-A144-B97F-1A7125096EB2}" type="datetimeFigureOut">
               <a:rPr lang="en-US" smtClean="0"/>
-              <a:t>10/30/21</a:t>
+              <a:t>11/1/2021</a:t>
             </a:fld>
             <a:endParaRPr lang="en-US"/>
           </a:p>
@@ -6540,7 +6624,7 @@
           <a:p>
             <a:fld id="{43D302DD-A437-A144-B97F-1A7125096EB2}" type="datetimeFigureOut">
               <a:rPr lang="en-US" smtClean="0"/>
-              <a:t>10/30/21</a:t>
+              <a:t>11/1/2021</a:t>
             </a:fld>
             <a:endParaRPr lang="en-US"/>
           </a:p>
@@ -6851,7 +6935,7 @@
           <a:p>
             <a:fld id="{43D302DD-A437-A144-B97F-1A7125096EB2}" type="datetimeFigureOut">
               <a:rPr lang="en-US" smtClean="0"/>
-              <a:t>10/30/21</a:t>
+              <a:t>11/1/2021</a:t>
             </a:fld>
             <a:endParaRPr lang="en-US"/>
           </a:p>
@@ -7139,7 +7223,7 @@
           <a:p>
             <a:fld id="{43D302DD-A437-A144-B97F-1A7125096EB2}" type="datetimeFigureOut">
               <a:rPr lang="en-US" smtClean="0"/>
-              <a:t>10/30/21</a:t>
+              <a:t>11/1/2021</a:t>
             </a:fld>
             <a:endParaRPr lang="en-US"/>
           </a:p>
@@ -7380,7 +7464,7 @@
           <a:p>
             <a:fld id="{43D302DD-A437-A144-B97F-1A7125096EB2}" type="datetimeFigureOut">
               <a:rPr lang="en-US" smtClean="0"/>
-              <a:t>10/30/21</a:t>
+              <a:t>11/1/2021</a:t>
             </a:fld>
             <a:endParaRPr lang="en-US"/>
           </a:p>
@@ -19079,7 +19163,7 @@
                 <a:ea typeface="+mj-ea"/>
                 <a:cs typeface="+mj-cs"/>
               </a:rPr>
-              <a:t>, using a JS library, we created our interactive online tool. </a:t>
+              <a:t>, using the Chart.js library, we created our interactive online tool. </a:t>
             </a:r>
           </a:p>
         </p:txBody>
@@ -19116,10 +19200,10 @@
       </p:grpSpPr>
       <p:pic>
         <p:nvPicPr>
-          <p:cNvPr id="7" name="Picture 6" descr="Chart, bubble chart&#10;&#10;Description automatically generated">
-            <a:extLst>
-              <a:ext uri="{FF2B5EF4-FFF2-40B4-BE49-F238E27FC236}">
-                <a16:creationId xmlns:a16="http://schemas.microsoft.com/office/drawing/2014/main" id="{00C34882-7FD9-A04B-A95A-9DF34F1A31E0}"/>
+          <p:cNvPr id="5" name="Picture 4">
+            <a:extLst>
+              <a:ext uri="{FF2B5EF4-FFF2-40B4-BE49-F238E27FC236}">
+                <a16:creationId xmlns:a16="http://schemas.microsoft.com/office/drawing/2014/main" id="{F9FD226C-9911-49C0-B214-540B814580E2}"/>
               </a:ext>
             </a:extLst>
           </p:cNvPr>
@@ -19128,15 +19212,16 @@
           </p:cNvPicPr>
           <p:nvPr/>
         </p:nvPicPr>
-        <p:blipFill rotWithShape="1">
+        <p:blipFill>
           <a:blip r:embed="rId3"/>
-          <a:srcRect l="20792" t="3531"/>
-          <a:stretch/>
+          <a:stretch>
+            <a:fillRect/>
+          </a:stretch>
         </p:blipFill>
         <p:spPr>
           <a:xfrm>
-            <a:off x="0" y="480526"/>
-            <a:ext cx="12130642" cy="5896947"/>
+            <a:off x="172065" y="352425"/>
+            <a:ext cx="11847870" cy="6153150"/>
           </a:xfrm>
           <a:prstGeom prst="rect">
             <a:avLst/>
@@ -24033,7 +24118,7 @@
         </p:nvSpPr>
         <p:spPr>
           <a:xfrm>
-            <a:off x="4162567" y="818984"/>
+            <a:off x="4162567" y="121400"/>
             <a:ext cx="7015506" cy="5750260"/>
           </a:xfrm>
         </p:spPr>
@@ -24084,16 +24169,6 @@
                 <a:cs typeface="+mj-cs"/>
               </a:rPr>
             </a:br>
-            <a:br>
-              <a:rPr lang="en-US" sz="3300" kern="1200" dirty="0">
-                <a:solidFill>
-                  <a:srgbClr val="FFFFFF"/>
-                </a:solidFill>
-                <a:latin typeface="+mj-lt"/>
-                <a:ea typeface="+mj-ea"/>
-                <a:cs typeface="+mj-cs"/>
-              </a:rPr>
-            </a:br>
             <a:r>
               <a:rPr lang="en-US" sz="3300" kern="1200" dirty="0">
                 <a:solidFill>
@@ -24103,28 +24178,7 @@
                 <a:ea typeface="+mj-ea"/>
                 <a:cs typeface="+mj-cs"/>
               </a:rPr>
-              <a:t>No one wants to go into go into negotiations without a sense of </a:t>
-            </a:r>
-            <a:br>
-              <a:rPr lang="en-US" sz="3300" kern="1200" dirty="0">
-                <a:solidFill>
-                  <a:srgbClr val="FFFFFF"/>
-                </a:solidFill>
-                <a:latin typeface="+mj-lt"/>
-                <a:ea typeface="+mj-ea"/>
-                <a:cs typeface="+mj-cs"/>
-              </a:rPr>
-            </a:br>
-            <a:r>
-              <a:rPr lang="en-US" sz="3300" kern="1200" dirty="0">
-                <a:solidFill>
-                  <a:srgbClr val="FFFFFF"/>
-                </a:solidFill>
-                <a:latin typeface="+mj-lt"/>
-                <a:ea typeface="+mj-ea"/>
-                <a:cs typeface="+mj-cs"/>
-              </a:rPr>
-              <a:t>what others are being paid and what they can ask for. </a:t>
+              <a:t>No one wants to go into negotiations without a sense of what others are being paid and what they can ask for. </a:t>
             </a:r>
           </a:p>
         </p:txBody>

</xml_diff>